<commit_message>
Add one page that was the Cardano news: Phone, Coffee
</commit_message>
<xml_diff>
--- a/images/images.pptx
+++ b/images/images.pptx
@@ -7,6 +7,7 @@
   <p:sldIdLst>
     <p:sldId id="258" r:id="rId2"/>
     <p:sldId id="259" r:id="rId3"/>
+    <p:sldId id="260" r:id="rId4"/>
   </p:sldIdLst>
   <p:sldSz cx="12192000" cy="6858000"/>
   <p:notesSz cx="6858000" cy="9144000"/>
@@ -105,6 +106,11 @@
       </a:defRPr>
     </a:lvl9pPr>
   </p:defaultTextStyle>
+  <p:extLst>
+    <p:ext uri="{EFAFB233-063F-42B5-8137-9DF3F51BA10A}">
+      <p15:sldGuideLst xmlns:p15="http://schemas.microsoft.com/office/powerpoint/2012/main"/>
+    </p:ext>
+  </p:extLst>
 </p:presentation>
 </file>
 
@@ -239,7 +245,7 @@
           <a:p>
             <a:fld id="{26DBD7CF-34DE-B74E-A67B-EF2276810DA8}" type="datetimeFigureOut">
               <a:rPr kumimoji="1" lang="zh-TW" altLang="en-US" smtClean="0"/>
-              <a:t>2018/6/3</a:t>
+              <a:t>2018/6/4</a:t>
             </a:fld>
             <a:endParaRPr kumimoji="1" lang="zh-TW" altLang="en-US"/>
           </a:p>
@@ -409,7 +415,7 @@
           <a:p>
             <a:fld id="{26DBD7CF-34DE-B74E-A67B-EF2276810DA8}" type="datetimeFigureOut">
               <a:rPr kumimoji="1" lang="zh-TW" altLang="en-US" smtClean="0"/>
-              <a:t>2018/6/3</a:t>
+              <a:t>2018/6/4</a:t>
             </a:fld>
             <a:endParaRPr kumimoji="1" lang="zh-TW" altLang="en-US"/>
           </a:p>
@@ -589,7 +595,7 @@
           <a:p>
             <a:fld id="{26DBD7CF-34DE-B74E-A67B-EF2276810DA8}" type="datetimeFigureOut">
               <a:rPr kumimoji="1" lang="zh-TW" altLang="en-US" smtClean="0"/>
-              <a:t>2018/6/3</a:t>
+              <a:t>2018/6/4</a:t>
             </a:fld>
             <a:endParaRPr kumimoji="1" lang="zh-TW" altLang="en-US"/>
           </a:p>
@@ -759,7 +765,7 @@
           <a:p>
             <a:fld id="{26DBD7CF-34DE-B74E-A67B-EF2276810DA8}" type="datetimeFigureOut">
               <a:rPr kumimoji="1" lang="zh-TW" altLang="en-US" smtClean="0"/>
-              <a:t>2018/6/3</a:t>
+              <a:t>2018/6/4</a:t>
             </a:fld>
             <a:endParaRPr kumimoji="1" lang="zh-TW" altLang="en-US"/>
           </a:p>
@@ -1005,7 +1011,7 @@
           <a:p>
             <a:fld id="{26DBD7CF-34DE-B74E-A67B-EF2276810DA8}" type="datetimeFigureOut">
               <a:rPr kumimoji="1" lang="zh-TW" altLang="en-US" smtClean="0"/>
-              <a:t>2018/6/3</a:t>
+              <a:t>2018/6/4</a:t>
             </a:fld>
             <a:endParaRPr kumimoji="1" lang="zh-TW" altLang="en-US"/>
           </a:p>
@@ -1237,7 +1243,7 @@
           <a:p>
             <a:fld id="{26DBD7CF-34DE-B74E-A67B-EF2276810DA8}" type="datetimeFigureOut">
               <a:rPr kumimoji="1" lang="zh-TW" altLang="en-US" smtClean="0"/>
-              <a:t>2018/6/3</a:t>
+              <a:t>2018/6/4</a:t>
             </a:fld>
             <a:endParaRPr kumimoji="1" lang="zh-TW" altLang="en-US"/>
           </a:p>
@@ -1604,7 +1610,7 @@
           <a:p>
             <a:fld id="{26DBD7CF-34DE-B74E-A67B-EF2276810DA8}" type="datetimeFigureOut">
               <a:rPr kumimoji="1" lang="zh-TW" altLang="en-US" smtClean="0"/>
-              <a:t>2018/6/3</a:t>
+              <a:t>2018/6/4</a:t>
             </a:fld>
             <a:endParaRPr kumimoji="1" lang="zh-TW" altLang="en-US"/>
           </a:p>
@@ -1722,7 +1728,7 @@
           <a:p>
             <a:fld id="{26DBD7CF-34DE-B74E-A67B-EF2276810DA8}" type="datetimeFigureOut">
               <a:rPr kumimoji="1" lang="zh-TW" altLang="en-US" smtClean="0"/>
-              <a:t>2018/6/3</a:t>
+              <a:t>2018/6/4</a:t>
             </a:fld>
             <a:endParaRPr kumimoji="1" lang="zh-TW" altLang="en-US"/>
           </a:p>
@@ -1817,7 +1823,7 @@
           <a:p>
             <a:fld id="{26DBD7CF-34DE-B74E-A67B-EF2276810DA8}" type="datetimeFigureOut">
               <a:rPr kumimoji="1" lang="zh-TW" altLang="en-US" smtClean="0"/>
-              <a:t>2018/6/3</a:t>
+              <a:t>2018/6/4</a:t>
             </a:fld>
             <a:endParaRPr kumimoji="1" lang="zh-TW" altLang="en-US"/>
           </a:p>
@@ -2094,7 +2100,7 @@
           <a:p>
             <a:fld id="{26DBD7CF-34DE-B74E-A67B-EF2276810DA8}" type="datetimeFigureOut">
               <a:rPr kumimoji="1" lang="zh-TW" altLang="en-US" smtClean="0"/>
-              <a:t>2018/6/3</a:t>
+              <a:t>2018/6/4</a:t>
             </a:fld>
             <a:endParaRPr kumimoji="1" lang="zh-TW" altLang="en-US"/>
           </a:p>
@@ -2347,7 +2353,7 @@
           <a:p>
             <a:fld id="{26DBD7CF-34DE-B74E-A67B-EF2276810DA8}" type="datetimeFigureOut">
               <a:rPr kumimoji="1" lang="zh-TW" altLang="en-US" smtClean="0"/>
-              <a:t>2018/6/3</a:t>
+              <a:t>2018/6/4</a:t>
             </a:fld>
             <a:endParaRPr kumimoji="1" lang="zh-TW" altLang="en-US"/>
           </a:p>
@@ -2560,7 +2566,7 @@
           <a:p>
             <a:fld id="{26DBD7CF-34DE-B74E-A67B-EF2276810DA8}" type="datetimeFigureOut">
               <a:rPr kumimoji="1" lang="zh-TW" altLang="en-US" smtClean="0"/>
-              <a:t>2018/6/3</a:t>
+              <a:t>2018/6/4</a:t>
             </a:fld>
             <a:endParaRPr kumimoji="1" lang="zh-TW" altLang="en-US"/>
           </a:p>
@@ -3312,6 +3318,129 @@
 </p:sld>
 </file>
 
+<file path=ppt/slides/slide3.xml><?xml version="1.0" encoding="utf-8"?>
+<p:sld xmlns:a="http://schemas.openxmlformats.org/drawingml/2006/main" xmlns:r="http://schemas.openxmlformats.org/officeDocument/2006/relationships" xmlns:p="http://schemas.openxmlformats.org/presentationml/2006/main">
+  <p:cSld>
+    <p:spTree>
+      <p:nvGrpSpPr>
+        <p:cNvPr id="1" name=""/>
+        <p:cNvGrpSpPr/>
+        <p:nvPr/>
+      </p:nvGrpSpPr>
+      <p:grpSpPr>
+        <a:xfrm>
+          <a:off x="0" y="0"/>
+          <a:ext cx="0" cy="0"/>
+          <a:chOff x="0" y="0"/>
+          <a:chExt cx="0" cy="0"/>
+        </a:xfrm>
+      </p:grpSpPr>
+      <p:pic>
+        <p:nvPicPr>
+          <p:cNvPr id="2" name="圖片 1"/>
+          <p:cNvPicPr>
+            <a:picLocks noChangeAspect="1"/>
+          </p:cNvPicPr>
+          <p:nvPr/>
+        </p:nvPicPr>
+        <p:blipFill rotWithShape="1">
+          <a:blip r:embed="rId2">
+            <a:extLst>
+              <a:ext uri="{28A0092B-C50C-407E-A947-70E740481C1C}">
+                <a14:useLocalDpi xmlns:a14="http://schemas.microsoft.com/office/drawing/2010/main" val="0"/>
+              </a:ext>
+            </a:extLst>
+          </a:blip>
+          <a:srcRect l="17533" t="13056" r="16800"/>
+          <a:stretch/>
+        </p:blipFill>
+        <p:spPr>
+          <a:xfrm>
+            <a:off x="1115121" y="388620"/>
+            <a:ext cx="4078600" cy="3600000"/>
+          </a:xfrm>
+          <a:prstGeom prst="rect">
+            <a:avLst/>
+          </a:prstGeom>
+          <a:ln w="88900" cap="sq" cmpd="thickThin">
+            <a:solidFill>
+              <a:srgbClr val="000000"/>
+            </a:solidFill>
+            <a:prstDash val="solid"/>
+            <a:miter lim="800000"/>
+          </a:ln>
+          <a:effectLst>
+            <a:innerShdw blurRad="76200">
+              <a:srgbClr val="000000"/>
+            </a:innerShdw>
+          </a:effectLst>
+        </p:spPr>
+      </p:pic>
+      <p:pic>
+        <p:nvPicPr>
+          <p:cNvPr id="1026" name="Picture 2" descr="ç¸éåç"/>
+          <p:cNvPicPr>
+            <a:picLocks noChangeAspect="1" noChangeArrowheads="1"/>
+          </p:cNvPicPr>
+          <p:nvPr/>
+        </p:nvPicPr>
+        <p:blipFill>
+          <a:blip r:embed="rId3">
+            <a:extLst>
+              <a:ext uri="{28A0092B-C50C-407E-A947-70E740481C1C}">
+                <a14:useLocalDpi xmlns:a14="http://schemas.microsoft.com/office/drawing/2010/main" val="0"/>
+              </a:ext>
+            </a:extLst>
+          </a:blip>
+          <a:srcRect/>
+          <a:stretch>
+            <a:fillRect/>
+          </a:stretch>
+        </p:blipFill>
+        <p:spPr bwMode="auto">
+          <a:xfrm>
+            <a:off x="5427896" y="388620"/>
+            <a:ext cx="4800000" cy="3600000"/>
+          </a:xfrm>
+          <a:prstGeom prst="rect">
+            <a:avLst/>
+          </a:prstGeom>
+          <a:ln w="88900" cap="sq" cmpd="thickThin">
+            <a:solidFill>
+              <a:srgbClr val="000000"/>
+            </a:solidFill>
+            <a:prstDash val="solid"/>
+            <a:miter lim="800000"/>
+          </a:ln>
+          <a:effectLst>
+            <a:innerShdw blurRad="76200">
+              <a:srgbClr val="000000"/>
+            </a:innerShdw>
+          </a:effectLst>
+          <a:extLst>
+            <a:ext uri="{909E8E84-426E-40DD-AFC4-6F175D3DCCD1}">
+              <a14:hiddenFill xmlns:a14="http://schemas.microsoft.com/office/drawing/2010/main">
+                <a:solidFill>
+                  <a:srgbClr val="FFFFFF"/>
+                </a:solidFill>
+              </a14:hiddenFill>
+            </a:ext>
+          </a:extLst>
+        </p:spPr>
+      </p:pic>
+    </p:spTree>
+    <p:extLst>
+      <p:ext uri="{BB962C8B-B14F-4D97-AF65-F5344CB8AC3E}">
+        <p14:creationId xmlns:p14="http://schemas.microsoft.com/office/powerpoint/2010/main" val="2008673570"/>
+      </p:ext>
+    </p:extLst>
+  </p:cSld>
+  <p:clrMapOvr>
+    <a:masterClrMapping/>
+  </p:clrMapOvr>
+</p:sld>
+</file>
+
 <file path=ppt/theme/theme1.xml><?xml version="1.0" encoding="utf-8"?>
 <a:theme xmlns:a="http://schemas.openxmlformats.org/drawingml/2006/main" name="Office 佈景主題">
   <a:themeElements>

</xml_diff>